<commit_message>
Updated format of presentation
</commit_message>
<xml_diff>
--- a/Presentation/FinalPresentation_APPM5460_LBDK.pptx
+++ b/Presentation/FinalPresentation_APPM5460_LBDK.pptx
@@ -5,14 +5,23 @@
     <p:sldMasterId id="2147483667" r:id="rId1"/>
   </p:sldMasterIdLst>
   <p:notesMasterIdLst>
-    <p:notesMasterId r:id="rId4"/>
+    <p:notesMasterId r:id="rId13"/>
   </p:notesMasterIdLst>
   <p:handoutMasterIdLst>
-    <p:handoutMasterId r:id="rId5"/>
+    <p:handoutMasterId r:id="rId14"/>
   </p:handoutMasterIdLst>
   <p:sldIdLst>
     <p:sldId id="256" r:id="rId2"/>
     <p:sldId id="259" r:id="rId3"/>
+    <p:sldId id="260" r:id="rId4"/>
+    <p:sldId id="261" r:id="rId5"/>
+    <p:sldId id="262" r:id="rId6"/>
+    <p:sldId id="263" r:id="rId7"/>
+    <p:sldId id="264" r:id="rId8"/>
+    <p:sldId id="265" r:id="rId9"/>
+    <p:sldId id="266" r:id="rId10"/>
+    <p:sldId id="267" r:id="rId11"/>
+    <p:sldId id="268" r:id="rId12"/>
   </p:sldIdLst>
   <p:sldSz cx="12192000" cy="6858000"/>
   <p:notesSz cx="6858000" cy="9144000"/>
@@ -204,7 +213,7 @@
           <a:p>
             <a:fld id="{92DD70E6-03CC-A14F-9739-7D72B75D20B5}" type="datetimeFigureOut">
               <a:rPr lang="en-US" smtClean="0"/>
-              <a:t>4/27/18</a:t>
+              <a:t>4/28/18</a:t>
             </a:fld>
             <a:endParaRPr lang="en-US"/>
           </a:p>
@@ -369,7 +378,7 @@
           <a:p>
             <a:fld id="{05E5AD0D-FC75-E94C-B105-C0F38CF37B04}" type="datetimeFigureOut">
               <a:rPr lang="en-US" smtClean="0"/>
-              <a:t>4/27/18</a:t>
+              <a:t>4/28/18</a:t>
             </a:fld>
             <a:endParaRPr lang="en-US"/>
           </a:p>
@@ -755,6 +764,178 @@
 </p:notes>
 </file>
 
+<file path=ppt/notesSlides/notesSlide2.xml><?xml version="1.0" encoding="utf-8"?>
+<p:notes xmlns:a="http://schemas.openxmlformats.org/drawingml/2006/main" xmlns:r="http://schemas.openxmlformats.org/officeDocument/2006/relationships" xmlns:p="http://schemas.openxmlformats.org/presentationml/2006/main">
+  <p:cSld>
+    <p:spTree>
+      <p:nvGrpSpPr>
+        <p:cNvPr id="1" name=""/>
+        <p:cNvGrpSpPr/>
+        <p:nvPr/>
+      </p:nvGrpSpPr>
+      <p:grpSpPr>
+        <a:xfrm>
+          <a:off x="0" y="0"/>
+          <a:ext cx="0" cy="0"/>
+          <a:chOff x="0" y="0"/>
+          <a:chExt cx="0" cy="0"/>
+        </a:xfrm>
+      </p:grpSpPr>
+      <p:sp>
+        <p:nvSpPr>
+          <p:cNvPr id="2" name="Slide Image Placeholder 1"/>
+          <p:cNvSpPr>
+            <a:spLocks noGrp="1" noRot="1" noChangeAspect="1"/>
+          </p:cNvSpPr>
+          <p:nvPr>
+            <p:ph type="sldImg"/>
+          </p:nvPr>
+        </p:nvSpPr>
+        <p:spPr/>
+      </p:sp>
+      <p:sp>
+        <p:nvSpPr>
+          <p:cNvPr id="3" name="Notes Placeholder 2"/>
+          <p:cNvSpPr>
+            <a:spLocks noGrp="1"/>
+          </p:cNvSpPr>
+          <p:nvPr>
+            <p:ph type="body" idx="1"/>
+          </p:nvPr>
+        </p:nvSpPr>
+        <p:spPr/>
+        <p:txBody>
+          <a:bodyPr/>
+          <a:lstStyle/>
+          <a:p>
+            <a:r>
+              <a:rPr lang="en-US" sz="1200" kern="1200">
+                <a:solidFill>
+                  <a:schemeClr val="tx1"/>
+                </a:solidFill>
+                <a:effectLst/>
+                <a:latin typeface="+mn-lt"/>
+                <a:ea typeface="+mn-ea"/>
+                <a:cs typeface="+mn-cs"/>
+              </a:rPr>
+              <a:t>-Homoclinic </a:t>
+            </a:r>
+            <a:r>
+              <a:rPr lang="en-US" sz="1200" kern="1200" dirty="0">
+                <a:solidFill>
+                  <a:schemeClr val="tx1"/>
+                </a:solidFill>
+                <a:effectLst/>
+                <a:latin typeface="+mn-lt"/>
+                <a:ea typeface="+mn-ea"/>
+                <a:cs typeface="+mn-cs"/>
+              </a:rPr>
+              <a:t>orbits can help understand flow of dynamic system, but for mission design, </a:t>
+            </a:r>
+            <a:r>
+              <a:rPr lang="en-US" sz="1200" kern="1200" dirty="0" err="1">
+                <a:solidFill>
+                  <a:schemeClr val="tx1"/>
+                </a:solidFill>
+                <a:effectLst/>
+                <a:latin typeface="+mn-lt"/>
+                <a:ea typeface="+mn-ea"/>
+                <a:cs typeface="+mn-cs"/>
+              </a:rPr>
+              <a:t>heterclinic</a:t>
+            </a:r>
+            <a:r>
+              <a:rPr lang="en-US" sz="1200" kern="1200" dirty="0">
+                <a:solidFill>
+                  <a:schemeClr val="tx1"/>
+                </a:solidFill>
+                <a:effectLst/>
+                <a:latin typeface="+mn-lt"/>
+                <a:ea typeface="+mn-ea"/>
+                <a:cs typeface="+mn-cs"/>
+              </a:rPr>
+              <a:t> orbits are of much greater use (moon transfers, </a:t>
+            </a:r>
+            <a:r>
+              <a:rPr lang="en-US" sz="1200" kern="1200" dirty="0" err="1">
+                <a:solidFill>
+                  <a:schemeClr val="tx1"/>
+                </a:solidFill>
+                <a:effectLst/>
+                <a:latin typeface="+mn-lt"/>
+                <a:ea typeface="+mn-ea"/>
+                <a:cs typeface="+mn-cs"/>
+              </a:rPr>
+              <a:t>etc</a:t>
+            </a:r>
+            <a:r>
+              <a:rPr lang="en-US" sz="1200" kern="1200" dirty="0">
+                <a:solidFill>
+                  <a:schemeClr val="tx1"/>
+                </a:solidFill>
+                <a:effectLst/>
+                <a:latin typeface="+mn-lt"/>
+                <a:ea typeface="+mn-ea"/>
+                <a:cs typeface="+mn-cs"/>
+              </a:rPr>
+              <a:t>)</a:t>
+            </a:r>
+          </a:p>
+          <a:p>
+            <a:r>
+              <a:rPr lang="en-US" sz="1200" kern="1200" dirty="0">
+                <a:solidFill>
+                  <a:schemeClr val="tx1"/>
+                </a:solidFill>
+                <a:effectLst/>
+                <a:latin typeface="+mn-lt"/>
+                <a:ea typeface="+mn-ea"/>
+                <a:cs typeface="+mn-cs"/>
+              </a:rPr>
+              <a:t>-Can cite some papers</a:t>
+            </a:r>
+          </a:p>
+          <a:p>
+            <a:endParaRPr lang="en-US" dirty="0"/>
+          </a:p>
+        </p:txBody>
+      </p:sp>
+      <p:sp>
+        <p:nvSpPr>
+          <p:cNvPr id="4" name="Slide Number Placeholder 3"/>
+          <p:cNvSpPr>
+            <a:spLocks noGrp="1"/>
+          </p:cNvSpPr>
+          <p:nvPr>
+            <p:ph type="sldNum" sz="quarter" idx="10"/>
+          </p:nvPr>
+        </p:nvSpPr>
+        <p:spPr/>
+        <p:txBody>
+          <a:bodyPr/>
+          <a:lstStyle/>
+          <a:p>
+            <a:fld id="{9A57B620-CD0B-A948-BBAE-2EA3E48E8FB5}" type="slidenum">
+              <a:rPr lang="en-US" smtClean="0"/>
+              <a:t>11</a:t>
+            </a:fld>
+            <a:endParaRPr lang="en-US"/>
+          </a:p>
+        </p:txBody>
+      </p:sp>
+    </p:spTree>
+    <p:extLst>
+      <p:ext uri="{BB962C8B-B14F-4D97-AF65-F5344CB8AC3E}">
+        <p14:creationId xmlns:p14="http://schemas.microsoft.com/office/powerpoint/2010/main" val="1848358351"/>
+      </p:ext>
+    </p:extLst>
+  </p:cSld>
+  <p:clrMapOvr>
+    <a:masterClrMapping/>
+  </p:clrMapOvr>
+</p:notes>
+</file>
+
 <file path=ppt/slideLayouts/slideLayout1.xml><?xml version="1.0" encoding="utf-8"?>
 <p:sldLayout xmlns:a="http://schemas.openxmlformats.org/drawingml/2006/main" xmlns:r="http://schemas.openxmlformats.org/officeDocument/2006/relationships" xmlns:p="http://schemas.openxmlformats.org/presentationml/2006/main" type="title" preserve="1">
   <p:cSld name="Title Slide">
@@ -1061,7 +1242,7 @@
           <a:p>
             <a:fld id="{B5A76CB0-E56E-FE43-AF6B-DE376AF36C11}" type="datetimeFigureOut">
               <a:rPr lang="en-US" smtClean="0"/>
-              <a:t>4/27/18</a:t>
+              <a:t>4/28/18</a:t>
             </a:fld>
             <a:endParaRPr lang="en-US"/>
           </a:p>
@@ -1205,7 +1386,7 @@
           <a:p>
             <a:fld id="{B5A76CB0-E56E-FE43-AF6B-DE376AF36C11}" type="datetimeFigureOut">
               <a:rPr lang="en-US" smtClean="0"/>
-              <a:t>4/27/18</a:t>
+              <a:t>4/28/18</a:t>
             </a:fld>
             <a:endParaRPr lang="en-US"/>
           </a:p>
@@ -3550,6 +3731,180 @@
 </p:sld>
 </file>
 
+<file path=ppt/slides/slide10.xml><?xml version="1.0" encoding="utf-8"?>
+<p:sld xmlns:a="http://schemas.openxmlformats.org/drawingml/2006/main" xmlns:r="http://schemas.openxmlformats.org/officeDocument/2006/relationships" xmlns:p="http://schemas.openxmlformats.org/presentationml/2006/main">
+  <p:cSld>
+    <p:spTree>
+      <p:nvGrpSpPr>
+        <p:cNvPr id="1" name=""/>
+        <p:cNvGrpSpPr/>
+        <p:nvPr/>
+      </p:nvGrpSpPr>
+      <p:grpSpPr>
+        <a:xfrm>
+          <a:off x="0" y="0"/>
+          <a:ext cx="0" cy="0"/>
+          <a:chOff x="0" y="0"/>
+          <a:chExt cx="0" cy="0"/>
+        </a:xfrm>
+      </p:grpSpPr>
+      <p:sp>
+        <p:nvSpPr>
+          <p:cNvPr id="2" name="Title 1">
+            <a:extLst>
+              <a:ext uri="{FF2B5EF4-FFF2-40B4-BE49-F238E27FC236}">
+                <a16:creationId xmlns:a16="http://schemas.microsoft.com/office/drawing/2014/main" id="{98EF3C7E-A5CE-5B44-9E5A-46149883995D}"/>
+              </a:ext>
+            </a:extLst>
+          </p:cNvPr>
+          <p:cNvSpPr>
+            <a:spLocks noGrp="1"/>
+          </p:cNvSpPr>
+          <p:nvPr>
+            <p:ph type="title"/>
+          </p:nvPr>
+        </p:nvSpPr>
+        <p:spPr/>
+        <p:txBody>
+          <a:bodyPr>
+            <a:normAutofit fontScale="90000"/>
+          </a:bodyPr>
+          <a:lstStyle/>
+          <a:p>
+            <a:r>
+              <a:rPr lang="en-US" dirty="0" err="1"/>
+              <a:t>Poincaré</a:t>
+            </a:r>
+            <a:r>
+              <a:rPr lang="en-US" dirty="0"/>
+              <a:t> Sections &amp; Homoclinic Orbits</a:t>
+            </a:r>
+          </a:p>
+        </p:txBody>
+      </p:sp>
+      <p:sp>
+        <p:nvSpPr>
+          <p:cNvPr id="3" name="Content Placeholder 2">
+            <a:extLst>
+              <a:ext uri="{FF2B5EF4-FFF2-40B4-BE49-F238E27FC236}">
+                <a16:creationId xmlns:a16="http://schemas.microsoft.com/office/drawing/2014/main" id="{CE594FAF-0E0A-1149-98A7-EFEEA59E2AD9}"/>
+              </a:ext>
+            </a:extLst>
+          </p:cNvPr>
+          <p:cNvSpPr>
+            <a:spLocks noGrp="1"/>
+          </p:cNvSpPr>
+          <p:nvPr>
+            <p:ph idx="1"/>
+          </p:nvPr>
+        </p:nvSpPr>
+        <p:spPr/>
+        <p:txBody>
+          <a:bodyPr/>
+          <a:lstStyle/>
+          <a:p>
+            <a:endParaRPr lang="en-US"/>
+          </a:p>
+        </p:txBody>
+      </p:sp>
+    </p:spTree>
+    <p:extLst>
+      <p:ext uri="{BB962C8B-B14F-4D97-AF65-F5344CB8AC3E}">
+        <p14:creationId xmlns:p14="http://schemas.microsoft.com/office/powerpoint/2010/main" val="2014041836"/>
+      </p:ext>
+    </p:extLst>
+  </p:cSld>
+  <p:clrMapOvr>
+    <a:masterClrMapping/>
+  </p:clrMapOvr>
+</p:sld>
+</file>
+
+<file path=ppt/slides/slide11.xml><?xml version="1.0" encoding="utf-8"?>
+<p:sld xmlns:a="http://schemas.openxmlformats.org/drawingml/2006/main" xmlns:r="http://schemas.openxmlformats.org/officeDocument/2006/relationships" xmlns:p="http://schemas.openxmlformats.org/presentationml/2006/main">
+  <p:cSld>
+    <p:spTree>
+      <p:nvGrpSpPr>
+        <p:cNvPr id="1" name=""/>
+        <p:cNvGrpSpPr/>
+        <p:nvPr/>
+      </p:nvGrpSpPr>
+      <p:grpSpPr>
+        <a:xfrm>
+          <a:off x="0" y="0"/>
+          <a:ext cx="0" cy="0"/>
+          <a:chOff x="0" y="0"/>
+          <a:chExt cx="0" cy="0"/>
+        </a:xfrm>
+      </p:grpSpPr>
+      <p:sp>
+        <p:nvSpPr>
+          <p:cNvPr id="2" name="Title 1">
+            <a:extLst>
+              <a:ext uri="{FF2B5EF4-FFF2-40B4-BE49-F238E27FC236}">
+                <a16:creationId xmlns:a16="http://schemas.microsoft.com/office/drawing/2014/main" id="{5FC1D5C7-04EF-1342-BF46-C5952F44F0F7}"/>
+              </a:ext>
+            </a:extLst>
+          </p:cNvPr>
+          <p:cNvSpPr>
+            <a:spLocks noGrp="1"/>
+          </p:cNvSpPr>
+          <p:nvPr>
+            <p:ph type="title"/>
+          </p:nvPr>
+        </p:nvSpPr>
+        <p:spPr/>
+        <p:txBody>
+          <a:bodyPr>
+            <a:normAutofit fontScale="90000"/>
+          </a:bodyPr>
+          <a:lstStyle/>
+          <a:p>
+            <a:r>
+              <a:rPr lang="en-US" dirty="0"/>
+              <a:t>Significance and Usefulness of Homoclinic Orbits</a:t>
+            </a:r>
+          </a:p>
+        </p:txBody>
+      </p:sp>
+      <p:sp>
+        <p:nvSpPr>
+          <p:cNvPr id="3" name="Content Placeholder 2">
+            <a:extLst>
+              <a:ext uri="{FF2B5EF4-FFF2-40B4-BE49-F238E27FC236}">
+                <a16:creationId xmlns:a16="http://schemas.microsoft.com/office/drawing/2014/main" id="{1AFA9565-1B5D-2848-94B2-79AFCE290D2D}"/>
+              </a:ext>
+            </a:extLst>
+          </p:cNvPr>
+          <p:cNvSpPr>
+            <a:spLocks noGrp="1"/>
+          </p:cNvSpPr>
+          <p:nvPr>
+            <p:ph idx="1"/>
+          </p:nvPr>
+        </p:nvSpPr>
+        <p:spPr/>
+        <p:txBody>
+          <a:bodyPr/>
+          <a:lstStyle/>
+          <a:p>
+            <a:endParaRPr lang="en-US"/>
+          </a:p>
+        </p:txBody>
+      </p:sp>
+    </p:spTree>
+    <p:extLst>
+      <p:ext uri="{BB962C8B-B14F-4D97-AF65-F5344CB8AC3E}">
+        <p14:creationId xmlns:p14="http://schemas.microsoft.com/office/powerpoint/2010/main" val="4137990797"/>
+      </p:ext>
+    </p:extLst>
+  </p:cSld>
+  <p:clrMapOvr>
+    <a:masterClrMapping/>
+  </p:clrMapOvr>
+</p:sld>
+</file>
+
 <file path=ppt/slides/slide2.xml><?xml version="1.0" encoding="utf-8"?>
 <p:sld xmlns:a="http://schemas.openxmlformats.org/drawingml/2006/main" xmlns:r="http://schemas.openxmlformats.org/officeDocument/2006/relationships" xmlns:p="http://schemas.openxmlformats.org/presentationml/2006/main">
   <p:cSld>
@@ -3585,9 +3940,10 @@
           <a:lstStyle/>
           <a:p>
             <a:r>
-              <a:rPr lang="en-US" dirty="0"/>
-              <a:t>Slide 1</a:t>
-            </a:r>
+              <a:rPr lang="en-US" dirty="0" err="1"/>
+              <a:t>Poincaré</a:t>
+            </a:r>
+            <a:endParaRPr lang="en-US" dirty="0"/>
           </a:p>
         </p:txBody>
       </p:sp>
@@ -3621,6 +3977,601 @@
     <p:extLst>
       <p:ext uri="{BB962C8B-B14F-4D97-AF65-F5344CB8AC3E}">
         <p14:creationId xmlns:p14="http://schemas.microsoft.com/office/powerpoint/2010/main" val="1502732275"/>
+      </p:ext>
+    </p:extLst>
+  </p:cSld>
+  <p:clrMapOvr>
+    <a:masterClrMapping/>
+  </p:clrMapOvr>
+</p:sld>
+</file>
+
+<file path=ppt/slides/slide3.xml><?xml version="1.0" encoding="utf-8"?>
+<p:sld xmlns:a="http://schemas.openxmlformats.org/drawingml/2006/main" xmlns:r="http://schemas.openxmlformats.org/officeDocument/2006/relationships" xmlns:p="http://schemas.openxmlformats.org/presentationml/2006/main">
+  <p:cSld>
+    <p:spTree>
+      <p:nvGrpSpPr>
+        <p:cNvPr id="1" name=""/>
+        <p:cNvGrpSpPr/>
+        <p:nvPr/>
+      </p:nvGrpSpPr>
+      <p:grpSpPr>
+        <a:xfrm>
+          <a:off x="0" y="0"/>
+          <a:ext cx="0" cy="0"/>
+          <a:chOff x="0" y="0"/>
+          <a:chExt cx="0" cy="0"/>
+        </a:xfrm>
+      </p:grpSpPr>
+      <p:sp>
+        <p:nvSpPr>
+          <p:cNvPr id="2" name="Title 1">
+            <a:extLst>
+              <a:ext uri="{FF2B5EF4-FFF2-40B4-BE49-F238E27FC236}">
+                <a16:creationId xmlns:a16="http://schemas.microsoft.com/office/drawing/2014/main" id="{BC161299-808D-204F-9682-252F158371E5}"/>
+              </a:ext>
+            </a:extLst>
+          </p:cNvPr>
+          <p:cNvSpPr>
+            <a:spLocks noGrp="1"/>
+          </p:cNvSpPr>
+          <p:nvPr>
+            <p:ph type="title"/>
+          </p:nvPr>
+        </p:nvSpPr>
+        <p:spPr/>
+        <p:txBody>
+          <a:bodyPr>
+            <a:normAutofit fontScale="90000"/>
+          </a:bodyPr>
+          <a:lstStyle/>
+          <a:p>
+            <a:r>
+              <a:rPr lang="en-US" dirty="0"/>
+              <a:t>The Competition</a:t>
+            </a:r>
+          </a:p>
+        </p:txBody>
+      </p:sp>
+      <p:sp>
+        <p:nvSpPr>
+          <p:cNvPr id="3" name="Content Placeholder 2">
+            <a:extLst>
+              <a:ext uri="{FF2B5EF4-FFF2-40B4-BE49-F238E27FC236}">
+                <a16:creationId xmlns:a16="http://schemas.microsoft.com/office/drawing/2014/main" id="{E39F4CE0-08BC-2A4C-B5D1-D9C6545B8996}"/>
+              </a:ext>
+            </a:extLst>
+          </p:cNvPr>
+          <p:cNvSpPr>
+            <a:spLocks noGrp="1"/>
+          </p:cNvSpPr>
+          <p:nvPr>
+            <p:ph idx="1"/>
+          </p:nvPr>
+        </p:nvSpPr>
+        <p:spPr/>
+        <p:txBody>
+          <a:bodyPr/>
+          <a:lstStyle/>
+          <a:p>
+            <a:endParaRPr lang="en-US"/>
+          </a:p>
+        </p:txBody>
+      </p:sp>
+    </p:spTree>
+    <p:extLst>
+      <p:ext uri="{BB962C8B-B14F-4D97-AF65-F5344CB8AC3E}">
+        <p14:creationId xmlns:p14="http://schemas.microsoft.com/office/powerpoint/2010/main" val="810430265"/>
+      </p:ext>
+    </p:extLst>
+  </p:cSld>
+  <p:clrMapOvr>
+    <a:masterClrMapping/>
+  </p:clrMapOvr>
+</p:sld>
+</file>
+
+<file path=ppt/slides/slide4.xml><?xml version="1.0" encoding="utf-8"?>
+<p:sld xmlns:a="http://schemas.openxmlformats.org/drawingml/2006/main" xmlns:r="http://schemas.openxmlformats.org/officeDocument/2006/relationships" xmlns:p="http://schemas.openxmlformats.org/presentationml/2006/main">
+  <p:cSld>
+    <p:spTree>
+      <p:nvGrpSpPr>
+        <p:cNvPr id="1" name=""/>
+        <p:cNvGrpSpPr/>
+        <p:nvPr/>
+      </p:nvGrpSpPr>
+      <p:grpSpPr>
+        <a:xfrm>
+          <a:off x="0" y="0"/>
+          <a:ext cx="0" cy="0"/>
+          <a:chOff x="0" y="0"/>
+          <a:chExt cx="0" cy="0"/>
+        </a:xfrm>
+      </p:grpSpPr>
+      <p:sp>
+        <p:nvSpPr>
+          <p:cNvPr id="2" name="Title 1">
+            <a:extLst>
+              <a:ext uri="{FF2B5EF4-FFF2-40B4-BE49-F238E27FC236}">
+                <a16:creationId xmlns:a16="http://schemas.microsoft.com/office/drawing/2014/main" id="{AAB80B22-0304-FC44-8D06-1822F7D814FF}"/>
+              </a:ext>
+            </a:extLst>
+          </p:cNvPr>
+          <p:cNvSpPr>
+            <a:spLocks noGrp="1"/>
+          </p:cNvSpPr>
+          <p:nvPr>
+            <p:ph type="title"/>
+          </p:nvPr>
+        </p:nvSpPr>
+        <p:spPr/>
+        <p:txBody>
+          <a:bodyPr>
+            <a:normAutofit fontScale="90000"/>
+          </a:bodyPr>
+          <a:lstStyle/>
+          <a:p>
+            <a:r>
+              <a:rPr lang="en-US" dirty="0"/>
+              <a:t>The Mistake &amp; Homoclinic Orbits</a:t>
+            </a:r>
+          </a:p>
+        </p:txBody>
+      </p:sp>
+      <p:sp>
+        <p:nvSpPr>
+          <p:cNvPr id="3" name="Content Placeholder 2">
+            <a:extLst>
+              <a:ext uri="{FF2B5EF4-FFF2-40B4-BE49-F238E27FC236}">
+                <a16:creationId xmlns:a16="http://schemas.microsoft.com/office/drawing/2014/main" id="{97D29C0A-5CD5-C64D-92D5-D31FF0E29F79}"/>
+              </a:ext>
+            </a:extLst>
+          </p:cNvPr>
+          <p:cNvSpPr>
+            <a:spLocks noGrp="1"/>
+          </p:cNvSpPr>
+          <p:nvPr>
+            <p:ph idx="1"/>
+          </p:nvPr>
+        </p:nvSpPr>
+        <p:spPr/>
+        <p:txBody>
+          <a:bodyPr/>
+          <a:lstStyle/>
+          <a:p>
+            <a:endParaRPr lang="en-US"/>
+          </a:p>
+        </p:txBody>
+      </p:sp>
+    </p:spTree>
+    <p:extLst>
+      <p:ext uri="{BB962C8B-B14F-4D97-AF65-F5344CB8AC3E}">
+        <p14:creationId xmlns:p14="http://schemas.microsoft.com/office/powerpoint/2010/main" val="2951183418"/>
+      </p:ext>
+    </p:extLst>
+  </p:cSld>
+  <p:clrMapOvr>
+    <a:masterClrMapping/>
+  </p:clrMapOvr>
+</p:sld>
+</file>
+
+<file path=ppt/slides/slide5.xml><?xml version="1.0" encoding="utf-8"?>
+<p:sld xmlns:a="http://schemas.openxmlformats.org/drawingml/2006/main" xmlns:r="http://schemas.openxmlformats.org/officeDocument/2006/relationships" xmlns:p="http://schemas.openxmlformats.org/presentationml/2006/main">
+  <p:cSld>
+    <p:spTree>
+      <p:nvGrpSpPr>
+        <p:cNvPr id="1" name=""/>
+        <p:cNvGrpSpPr/>
+        <p:nvPr/>
+      </p:nvGrpSpPr>
+      <p:grpSpPr>
+        <a:xfrm>
+          <a:off x="0" y="0"/>
+          <a:ext cx="0" cy="0"/>
+          <a:chOff x="0" y="0"/>
+          <a:chExt cx="0" cy="0"/>
+        </a:xfrm>
+      </p:grpSpPr>
+      <p:sp>
+        <p:nvSpPr>
+          <p:cNvPr id="2" name="Title 1">
+            <a:extLst>
+              <a:ext uri="{FF2B5EF4-FFF2-40B4-BE49-F238E27FC236}">
+                <a16:creationId xmlns:a16="http://schemas.microsoft.com/office/drawing/2014/main" id="{7F37FC75-EA9D-664F-97F6-DC611FCB22F1}"/>
+              </a:ext>
+            </a:extLst>
+          </p:cNvPr>
+          <p:cNvSpPr>
+            <a:spLocks noGrp="1"/>
+          </p:cNvSpPr>
+          <p:nvPr>
+            <p:ph type="title"/>
+          </p:nvPr>
+        </p:nvSpPr>
+        <p:spPr/>
+        <p:txBody>
+          <a:bodyPr>
+            <a:normAutofit fontScale="90000"/>
+          </a:bodyPr>
+          <a:lstStyle/>
+          <a:p>
+            <a:r>
+              <a:rPr lang="en-US" dirty="0"/>
+              <a:t>Location of Homoclinic Orbits</a:t>
+            </a:r>
+          </a:p>
+        </p:txBody>
+      </p:sp>
+      <p:sp>
+        <p:nvSpPr>
+          <p:cNvPr id="3" name="Content Placeholder 2">
+            <a:extLst>
+              <a:ext uri="{FF2B5EF4-FFF2-40B4-BE49-F238E27FC236}">
+                <a16:creationId xmlns:a16="http://schemas.microsoft.com/office/drawing/2014/main" id="{5AF0A3A4-7DCE-BA4F-B3E7-80738FC4C465}"/>
+              </a:ext>
+            </a:extLst>
+          </p:cNvPr>
+          <p:cNvSpPr>
+            <a:spLocks noGrp="1"/>
+          </p:cNvSpPr>
+          <p:nvPr>
+            <p:ph idx="1"/>
+          </p:nvPr>
+        </p:nvSpPr>
+        <p:spPr/>
+        <p:txBody>
+          <a:bodyPr/>
+          <a:lstStyle/>
+          <a:p>
+            <a:endParaRPr lang="en-US"/>
+          </a:p>
+        </p:txBody>
+      </p:sp>
+    </p:spTree>
+    <p:extLst>
+      <p:ext uri="{BB962C8B-B14F-4D97-AF65-F5344CB8AC3E}">
+        <p14:creationId xmlns:p14="http://schemas.microsoft.com/office/powerpoint/2010/main" val="1327660693"/>
+      </p:ext>
+    </p:extLst>
+  </p:cSld>
+  <p:clrMapOvr>
+    <a:masterClrMapping/>
+  </p:clrMapOvr>
+</p:sld>
+</file>
+
+<file path=ppt/slides/slide6.xml><?xml version="1.0" encoding="utf-8"?>
+<p:sld xmlns:a="http://schemas.openxmlformats.org/drawingml/2006/main" xmlns:r="http://schemas.openxmlformats.org/officeDocument/2006/relationships" xmlns:p="http://schemas.openxmlformats.org/presentationml/2006/main">
+  <p:cSld>
+    <p:spTree>
+      <p:nvGrpSpPr>
+        <p:cNvPr id="1" name=""/>
+        <p:cNvGrpSpPr/>
+        <p:nvPr/>
+      </p:nvGrpSpPr>
+      <p:grpSpPr>
+        <a:xfrm>
+          <a:off x="0" y="0"/>
+          <a:ext cx="0" cy="0"/>
+          <a:chOff x="0" y="0"/>
+          <a:chExt cx="0" cy="0"/>
+        </a:xfrm>
+      </p:grpSpPr>
+      <p:sp>
+        <p:nvSpPr>
+          <p:cNvPr id="2" name="Title 1">
+            <a:extLst>
+              <a:ext uri="{FF2B5EF4-FFF2-40B4-BE49-F238E27FC236}">
+                <a16:creationId xmlns:a16="http://schemas.microsoft.com/office/drawing/2014/main" id="{2102F036-9E45-4C41-8D3D-E76C9DB0423A}"/>
+              </a:ext>
+            </a:extLst>
+          </p:cNvPr>
+          <p:cNvSpPr>
+            <a:spLocks noGrp="1"/>
+          </p:cNvSpPr>
+          <p:nvPr>
+            <p:ph type="title"/>
+          </p:nvPr>
+        </p:nvSpPr>
+        <p:spPr/>
+        <p:txBody>
+          <a:bodyPr>
+            <a:normAutofit fontScale="90000"/>
+          </a:bodyPr>
+          <a:lstStyle/>
+          <a:p>
+            <a:r>
+              <a:rPr lang="en-US" dirty="0"/>
+              <a:t>Circular Restricted Three Body Problem</a:t>
+            </a:r>
+          </a:p>
+        </p:txBody>
+      </p:sp>
+      <p:sp>
+        <p:nvSpPr>
+          <p:cNvPr id="3" name="Content Placeholder 2">
+            <a:extLst>
+              <a:ext uri="{FF2B5EF4-FFF2-40B4-BE49-F238E27FC236}">
+                <a16:creationId xmlns:a16="http://schemas.microsoft.com/office/drawing/2014/main" id="{ED70783C-5D79-B040-864F-E1B6E4497E7D}"/>
+              </a:ext>
+            </a:extLst>
+          </p:cNvPr>
+          <p:cNvSpPr>
+            <a:spLocks noGrp="1"/>
+          </p:cNvSpPr>
+          <p:nvPr>
+            <p:ph idx="1"/>
+          </p:nvPr>
+        </p:nvSpPr>
+        <p:spPr/>
+        <p:txBody>
+          <a:bodyPr/>
+          <a:lstStyle/>
+          <a:p>
+            <a:endParaRPr lang="en-US"/>
+          </a:p>
+        </p:txBody>
+      </p:sp>
+    </p:spTree>
+    <p:extLst>
+      <p:ext uri="{BB962C8B-B14F-4D97-AF65-F5344CB8AC3E}">
+        <p14:creationId xmlns:p14="http://schemas.microsoft.com/office/powerpoint/2010/main" val="3524626047"/>
+      </p:ext>
+    </p:extLst>
+  </p:cSld>
+  <p:clrMapOvr>
+    <a:masterClrMapping/>
+  </p:clrMapOvr>
+</p:sld>
+</file>
+
+<file path=ppt/slides/slide7.xml><?xml version="1.0" encoding="utf-8"?>
+<p:sld xmlns:a="http://schemas.openxmlformats.org/drawingml/2006/main" xmlns:r="http://schemas.openxmlformats.org/officeDocument/2006/relationships" xmlns:p="http://schemas.openxmlformats.org/presentationml/2006/main">
+  <p:cSld>
+    <p:spTree>
+      <p:nvGrpSpPr>
+        <p:cNvPr id="1" name=""/>
+        <p:cNvGrpSpPr/>
+        <p:nvPr/>
+      </p:nvGrpSpPr>
+      <p:grpSpPr>
+        <a:xfrm>
+          <a:off x="0" y="0"/>
+          <a:ext cx="0" cy="0"/>
+          <a:chOff x="0" y="0"/>
+          <a:chExt cx="0" cy="0"/>
+        </a:xfrm>
+      </p:grpSpPr>
+      <p:sp>
+        <p:nvSpPr>
+          <p:cNvPr id="2" name="Title 1">
+            <a:extLst>
+              <a:ext uri="{FF2B5EF4-FFF2-40B4-BE49-F238E27FC236}">
+                <a16:creationId xmlns:a16="http://schemas.microsoft.com/office/drawing/2014/main" id="{F5E98741-C76F-0445-8991-9E17D7D95290}"/>
+              </a:ext>
+            </a:extLst>
+          </p:cNvPr>
+          <p:cNvSpPr>
+            <a:spLocks noGrp="1"/>
+          </p:cNvSpPr>
+          <p:nvPr>
+            <p:ph type="title"/>
+          </p:nvPr>
+        </p:nvSpPr>
+        <p:spPr/>
+        <p:txBody>
+          <a:bodyPr>
+            <a:normAutofit fontScale="90000"/>
+          </a:bodyPr>
+          <a:lstStyle/>
+          <a:p>
+            <a:r>
+              <a:rPr lang="en-US" dirty="0"/>
+              <a:t>Equilibrium Points &amp; Stability</a:t>
+            </a:r>
+          </a:p>
+        </p:txBody>
+      </p:sp>
+      <p:sp>
+        <p:nvSpPr>
+          <p:cNvPr id="3" name="Content Placeholder 2">
+            <a:extLst>
+              <a:ext uri="{FF2B5EF4-FFF2-40B4-BE49-F238E27FC236}">
+                <a16:creationId xmlns:a16="http://schemas.microsoft.com/office/drawing/2014/main" id="{CDED3D2B-5B9A-6F47-9A20-6D0E723BE407}"/>
+              </a:ext>
+            </a:extLst>
+          </p:cNvPr>
+          <p:cNvSpPr>
+            <a:spLocks noGrp="1"/>
+          </p:cNvSpPr>
+          <p:nvPr>
+            <p:ph idx="1"/>
+          </p:nvPr>
+        </p:nvSpPr>
+        <p:spPr/>
+        <p:txBody>
+          <a:bodyPr/>
+          <a:lstStyle/>
+          <a:p>
+            <a:endParaRPr lang="en-US"/>
+          </a:p>
+        </p:txBody>
+      </p:sp>
+    </p:spTree>
+    <p:extLst>
+      <p:ext uri="{BB962C8B-B14F-4D97-AF65-F5344CB8AC3E}">
+        <p14:creationId xmlns:p14="http://schemas.microsoft.com/office/powerpoint/2010/main" val="3204802608"/>
+      </p:ext>
+    </p:extLst>
+  </p:cSld>
+  <p:clrMapOvr>
+    <a:masterClrMapping/>
+  </p:clrMapOvr>
+</p:sld>
+</file>
+
+<file path=ppt/slides/slide8.xml><?xml version="1.0" encoding="utf-8"?>
+<p:sld xmlns:a="http://schemas.openxmlformats.org/drawingml/2006/main" xmlns:r="http://schemas.openxmlformats.org/officeDocument/2006/relationships" xmlns:p="http://schemas.openxmlformats.org/presentationml/2006/main">
+  <p:cSld>
+    <p:spTree>
+      <p:nvGrpSpPr>
+        <p:cNvPr id="1" name=""/>
+        <p:cNvGrpSpPr/>
+        <p:nvPr/>
+      </p:nvGrpSpPr>
+      <p:grpSpPr>
+        <a:xfrm>
+          <a:off x="0" y="0"/>
+          <a:ext cx="0" cy="0"/>
+          <a:chOff x="0" y="0"/>
+          <a:chExt cx="0" cy="0"/>
+        </a:xfrm>
+      </p:grpSpPr>
+      <p:sp>
+        <p:nvSpPr>
+          <p:cNvPr id="2" name="Title 1">
+            <a:extLst>
+              <a:ext uri="{FF2B5EF4-FFF2-40B4-BE49-F238E27FC236}">
+                <a16:creationId xmlns:a16="http://schemas.microsoft.com/office/drawing/2014/main" id="{A8D5FB6B-24B3-3E46-A36F-477CF95759C4}"/>
+              </a:ext>
+            </a:extLst>
+          </p:cNvPr>
+          <p:cNvSpPr>
+            <a:spLocks noGrp="1"/>
+          </p:cNvSpPr>
+          <p:nvPr>
+            <p:ph type="title"/>
+          </p:nvPr>
+        </p:nvSpPr>
+        <p:spPr/>
+        <p:txBody>
+          <a:bodyPr>
+            <a:normAutofit fontScale="90000"/>
+          </a:bodyPr>
+          <a:lstStyle/>
+          <a:p>
+            <a:r>
+              <a:rPr lang="en-US" dirty="0"/>
+              <a:t>Periodic Orbits &amp; Families</a:t>
+            </a:r>
+          </a:p>
+        </p:txBody>
+      </p:sp>
+      <p:sp>
+        <p:nvSpPr>
+          <p:cNvPr id="3" name="Content Placeholder 2">
+            <a:extLst>
+              <a:ext uri="{FF2B5EF4-FFF2-40B4-BE49-F238E27FC236}">
+                <a16:creationId xmlns:a16="http://schemas.microsoft.com/office/drawing/2014/main" id="{4605C30B-6868-2049-B4D8-A18A094A429C}"/>
+              </a:ext>
+            </a:extLst>
+          </p:cNvPr>
+          <p:cNvSpPr>
+            <a:spLocks noGrp="1"/>
+          </p:cNvSpPr>
+          <p:nvPr>
+            <p:ph idx="1"/>
+          </p:nvPr>
+        </p:nvSpPr>
+        <p:spPr/>
+        <p:txBody>
+          <a:bodyPr/>
+          <a:lstStyle/>
+          <a:p>
+            <a:endParaRPr lang="en-US"/>
+          </a:p>
+        </p:txBody>
+      </p:sp>
+    </p:spTree>
+    <p:extLst>
+      <p:ext uri="{BB962C8B-B14F-4D97-AF65-F5344CB8AC3E}">
+        <p14:creationId xmlns:p14="http://schemas.microsoft.com/office/powerpoint/2010/main" val="18555378"/>
+      </p:ext>
+    </p:extLst>
+  </p:cSld>
+  <p:clrMapOvr>
+    <a:masterClrMapping/>
+  </p:clrMapOvr>
+</p:sld>
+</file>
+
+<file path=ppt/slides/slide9.xml><?xml version="1.0" encoding="utf-8"?>
+<p:sld xmlns:a="http://schemas.openxmlformats.org/drawingml/2006/main" xmlns:r="http://schemas.openxmlformats.org/officeDocument/2006/relationships" xmlns:p="http://schemas.openxmlformats.org/presentationml/2006/main">
+  <p:cSld>
+    <p:spTree>
+      <p:nvGrpSpPr>
+        <p:cNvPr id="1" name=""/>
+        <p:cNvGrpSpPr/>
+        <p:nvPr/>
+      </p:nvGrpSpPr>
+      <p:grpSpPr>
+        <a:xfrm>
+          <a:off x="0" y="0"/>
+          <a:ext cx="0" cy="0"/>
+          <a:chOff x="0" y="0"/>
+          <a:chExt cx="0" cy="0"/>
+        </a:xfrm>
+      </p:grpSpPr>
+      <p:sp>
+        <p:nvSpPr>
+          <p:cNvPr id="2" name="Title 1">
+            <a:extLst>
+              <a:ext uri="{FF2B5EF4-FFF2-40B4-BE49-F238E27FC236}">
+                <a16:creationId xmlns:a16="http://schemas.microsoft.com/office/drawing/2014/main" id="{7A31FDB6-4C02-264A-A4E1-38AD67BC6F32}"/>
+              </a:ext>
+            </a:extLst>
+          </p:cNvPr>
+          <p:cNvSpPr>
+            <a:spLocks noGrp="1"/>
+          </p:cNvSpPr>
+          <p:nvPr>
+            <p:ph type="title"/>
+          </p:nvPr>
+        </p:nvSpPr>
+        <p:spPr/>
+        <p:txBody>
+          <a:bodyPr>
+            <a:normAutofit fontScale="90000"/>
+          </a:bodyPr>
+          <a:lstStyle/>
+          <a:p>
+            <a:r>
+              <a:rPr lang="en-US" dirty="0"/>
+              <a:t>Manifolds</a:t>
+            </a:r>
+          </a:p>
+        </p:txBody>
+      </p:sp>
+      <p:sp>
+        <p:nvSpPr>
+          <p:cNvPr id="3" name="Content Placeholder 2">
+            <a:extLst>
+              <a:ext uri="{FF2B5EF4-FFF2-40B4-BE49-F238E27FC236}">
+                <a16:creationId xmlns:a16="http://schemas.microsoft.com/office/drawing/2014/main" id="{99E1B4B5-12E2-C84F-A743-8CD50F384C08}"/>
+              </a:ext>
+            </a:extLst>
+          </p:cNvPr>
+          <p:cNvSpPr>
+            <a:spLocks noGrp="1"/>
+          </p:cNvSpPr>
+          <p:nvPr>
+            <p:ph idx="1"/>
+          </p:nvPr>
+        </p:nvSpPr>
+        <p:spPr/>
+        <p:txBody>
+          <a:bodyPr/>
+          <a:lstStyle/>
+          <a:p>
+            <a:endParaRPr lang="en-US"/>
+          </a:p>
+        </p:txBody>
+      </p:sp>
+    </p:spTree>
+    <p:extLst>
+      <p:ext uri="{BB962C8B-B14F-4D97-AF65-F5344CB8AC3E}">
+        <p14:creationId xmlns:p14="http://schemas.microsoft.com/office/powerpoint/2010/main" val="36606798"/>
       </p:ext>
     </p:extLst>
   </p:cSld>

</xml_diff>